<commit_message>
#531 Preliminary icon and app made suitable for publishing on the AIMMS Clouds and on AIMMS PRO on Prem.
</commit_message>
<xml_diff>
--- a/Articles/531/images/edit-gantt.pptx
+++ b/Articles/531/images/edit-gantt.pptx
@@ -7,6 +7,7 @@
   <p:sldIdLst>
     <p:sldId id="256" r:id="rId2"/>
     <p:sldId id="257" r:id="rId3"/>
+    <p:sldId id="258" r:id="rId4"/>
   </p:sldIdLst>
   <p:sldSz cx="12192000" cy="6858000"/>
   <p:notesSz cx="6858000" cy="9144000"/>
@@ -105,6 +106,11 @@
       </a:defRPr>
     </a:lvl9pPr>
   </p:defaultTextStyle>
+  <p:extLst>
+    <p:ext uri="{EFAFB233-063F-42B5-8137-9DF3F51BA10A}">
+      <p15:sldGuideLst xmlns:p15="http://schemas.microsoft.com/office/powerpoint/2012/main"/>
+    </p:ext>
+  </p:extLst>
 </p:presentation>
 </file>
 
@@ -255,7 +261,7 @@
           <a:p>
             <a:fld id="{41F90792-B3D2-4CDF-9F3C-E59968B51006}" type="datetimeFigureOut">
               <a:rPr lang="en-US" smtClean="0"/>
-              <a:t>1/14/2022</a:t>
+              <a:t>1/15/2022</a:t>
             </a:fld>
             <a:endParaRPr lang="en-US"/>
           </a:p>
@@ -453,7 +459,7 @@
           <a:p>
             <a:fld id="{41F90792-B3D2-4CDF-9F3C-E59968B51006}" type="datetimeFigureOut">
               <a:rPr lang="en-US" smtClean="0"/>
-              <a:t>1/14/2022</a:t>
+              <a:t>1/15/2022</a:t>
             </a:fld>
             <a:endParaRPr lang="en-US"/>
           </a:p>
@@ -661,7 +667,7 @@
           <a:p>
             <a:fld id="{41F90792-B3D2-4CDF-9F3C-E59968B51006}" type="datetimeFigureOut">
               <a:rPr lang="en-US" smtClean="0"/>
-              <a:t>1/14/2022</a:t>
+              <a:t>1/15/2022</a:t>
             </a:fld>
             <a:endParaRPr lang="en-US"/>
           </a:p>
@@ -859,7 +865,7 @@
           <a:p>
             <a:fld id="{41F90792-B3D2-4CDF-9F3C-E59968B51006}" type="datetimeFigureOut">
               <a:rPr lang="en-US" smtClean="0"/>
-              <a:t>1/14/2022</a:t>
+              <a:t>1/15/2022</a:t>
             </a:fld>
             <a:endParaRPr lang="en-US"/>
           </a:p>
@@ -1134,7 +1140,7 @@
           <a:p>
             <a:fld id="{41F90792-B3D2-4CDF-9F3C-E59968B51006}" type="datetimeFigureOut">
               <a:rPr lang="en-US" smtClean="0"/>
-              <a:t>1/14/2022</a:t>
+              <a:t>1/15/2022</a:t>
             </a:fld>
             <a:endParaRPr lang="en-US"/>
           </a:p>
@@ -1399,7 +1405,7 @@
           <a:p>
             <a:fld id="{41F90792-B3D2-4CDF-9F3C-E59968B51006}" type="datetimeFigureOut">
               <a:rPr lang="en-US" smtClean="0"/>
-              <a:t>1/14/2022</a:t>
+              <a:t>1/15/2022</a:t>
             </a:fld>
             <a:endParaRPr lang="en-US"/>
           </a:p>
@@ -1811,7 +1817,7 @@
           <a:p>
             <a:fld id="{41F90792-B3D2-4CDF-9F3C-E59968B51006}" type="datetimeFigureOut">
               <a:rPr lang="en-US" smtClean="0"/>
-              <a:t>1/14/2022</a:t>
+              <a:t>1/15/2022</a:t>
             </a:fld>
             <a:endParaRPr lang="en-US"/>
           </a:p>
@@ -1952,7 +1958,7 @@
           <a:p>
             <a:fld id="{41F90792-B3D2-4CDF-9F3C-E59968B51006}" type="datetimeFigureOut">
               <a:rPr lang="en-US" smtClean="0"/>
-              <a:t>1/14/2022</a:t>
+              <a:t>1/15/2022</a:t>
             </a:fld>
             <a:endParaRPr lang="en-US"/>
           </a:p>
@@ -2065,7 +2071,7 @@
           <a:p>
             <a:fld id="{41F90792-B3D2-4CDF-9F3C-E59968B51006}" type="datetimeFigureOut">
               <a:rPr lang="en-US" smtClean="0"/>
-              <a:t>1/14/2022</a:t>
+              <a:t>1/15/2022</a:t>
             </a:fld>
             <a:endParaRPr lang="en-US"/>
           </a:p>
@@ -2376,7 +2382,7 @@
           <a:p>
             <a:fld id="{41F90792-B3D2-4CDF-9F3C-E59968B51006}" type="datetimeFigureOut">
               <a:rPr lang="en-US" smtClean="0"/>
-              <a:t>1/14/2022</a:t>
+              <a:t>1/15/2022</a:t>
             </a:fld>
             <a:endParaRPr lang="en-US"/>
           </a:p>
@@ -2664,7 +2670,7 @@
           <a:p>
             <a:fld id="{41F90792-B3D2-4CDF-9F3C-E59968B51006}" type="datetimeFigureOut">
               <a:rPr lang="en-US" smtClean="0"/>
-              <a:t>1/14/2022</a:t>
+              <a:t>1/15/2022</a:t>
             </a:fld>
             <a:endParaRPr lang="en-US"/>
           </a:p>
@@ -2905,7 +2911,7 @@
           <a:p>
             <a:fld id="{41F90792-B3D2-4CDF-9F3C-E59968B51006}" type="datetimeFigureOut">
               <a:rPr lang="en-US" smtClean="0"/>
-              <a:t>1/14/2022</a:t>
+              <a:t>1/15/2022</a:t>
             </a:fld>
             <a:endParaRPr lang="en-US"/>
           </a:p>
@@ -3487,6 +3493,108 @@
 </p:sld>
 </file>
 
+<file path=ppt/slides/slide3.xml><?xml version="1.0" encoding="utf-8"?>
+<p:sld xmlns:a="http://schemas.openxmlformats.org/drawingml/2006/main" xmlns:r="http://schemas.openxmlformats.org/officeDocument/2006/relationships" xmlns:p="http://schemas.openxmlformats.org/presentationml/2006/main">
+  <p:cSld>
+    <p:spTree>
+      <p:nvGrpSpPr>
+        <p:cNvPr id="1" name=""/>
+        <p:cNvGrpSpPr/>
+        <p:nvPr/>
+      </p:nvGrpSpPr>
+      <p:grpSpPr>
+        <a:xfrm>
+          <a:off x="0" y="0"/>
+          <a:ext cx="0" cy="0"/>
+          <a:chOff x="0" y="0"/>
+          <a:chExt cx="0" cy="0"/>
+        </a:xfrm>
+      </p:grpSpPr>
+      <p:pic>
+        <p:nvPicPr>
+          <p:cNvPr id="3" name="Picture 2" descr="Diagram, map&#10;&#10;Description automatically generated">
+            <a:extLst>
+              <a:ext uri="{FF2B5EF4-FFF2-40B4-BE49-F238E27FC236}">
+                <a16:creationId xmlns:a16="http://schemas.microsoft.com/office/drawing/2014/main" id="{050AC2AF-2FA0-41DA-BA96-755B188B2D9E}"/>
+              </a:ext>
+            </a:extLst>
+          </p:cNvPr>
+          <p:cNvPicPr>
+            <a:picLocks noChangeAspect="1"/>
+          </p:cNvPicPr>
+          <p:nvPr/>
+        </p:nvPicPr>
+        <p:blipFill>
+          <a:blip r:embed="rId2">
+            <a:extLst>
+              <a:ext uri="{28A0092B-C50C-407E-A947-70E740481C1C}">
+                <a14:useLocalDpi xmlns:a14="http://schemas.microsoft.com/office/drawing/2010/main" val="0"/>
+              </a:ext>
+            </a:extLst>
+          </a:blip>
+          <a:stretch>
+            <a:fillRect/>
+          </a:stretch>
+        </p:blipFill>
+        <p:spPr>
+          <a:xfrm>
+            <a:off x="5292020" y="2396400"/>
+            <a:ext cx="1607959" cy="2065199"/>
+          </a:xfrm>
+          <a:prstGeom prst="rect">
+            <a:avLst/>
+          </a:prstGeom>
+        </p:spPr>
+      </p:pic>
+      <p:pic>
+        <p:nvPicPr>
+          <p:cNvPr id="5" name="Picture 4" descr="Graphical user interface&#10;&#10;Description automatically generated">
+            <a:extLst>
+              <a:ext uri="{FF2B5EF4-FFF2-40B4-BE49-F238E27FC236}">
+                <a16:creationId xmlns:a16="http://schemas.microsoft.com/office/drawing/2014/main" id="{CBE2DF9E-D0A6-4CFC-921A-FADD6BFB644F}"/>
+              </a:ext>
+            </a:extLst>
+          </p:cNvPr>
+          <p:cNvPicPr>
+            <a:picLocks noChangeAspect="1"/>
+          </p:cNvPicPr>
+          <p:nvPr/>
+        </p:nvPicPr>
+        <p:blipFill>
+          <a:blip r:embed="rId3">
+            <a:extLst>
+              <a:ext uri="{28A0092B-C50C-407E-A947-70E740481C1C}">
+                <a14:useLocalDpi xmlns:a14="http://schemas.microsoft.com/office/drawing/2010/main" val="0"/>
+              </a:ext>
+            </a:extLst>
+          </a:blip>
+          <a:stretch>
+            <a:fillRect/>
+          </a:stretch>
+        </p:blipFill>
+        <p:spPr>
+          <a:xfrm>
+            <a:off x="3814597" y="2396400"/>
+            <a:ext cx="1379340" cy="1661304"/>
+          </a:xfrm>
+          <a:prstGeom prst="rect">
+            <a:avLst/>
+          </a:prstGeom>
+        </p:spPr>
+      </p:pic>
+    </p:spTree>
+    <p:extLst>
+      <p:ext uri="{BB962C8B-B14F-4D97-AF65-F5344CB8AC3E}">
+        <p14:creationId xmlns:p14="http://schemas.microsoft.com/office/powerpoint/2010/main" val="2675382838"/>
+      </p:ext>
+    </p:extLst>
+  </p:cSld>
+  <p:clrMapOvr>
+    <a:masterClrMapping/>
+  </p:clrMapOvr>
+</p:sld>
+</file>
+
 <file path=ppt/theme/theme1.xml><?xml version="1.0" encoding="utf-8"?>
 <a:theme xmlns:a="http://schemas.openxmlformats.org/drawingml/2006/main" name="Office Theme">
   <a:themeElements>

</xml_diff>